<commit_message>
Add QR scan code in PPT.
</commit_message>
<xml_diff>
--- a/颜林林-生物信息学中的信息搜索方法-20240909.pptx
+++ b/颜林林-生物信息学中的信息搜索方法-20240909.pptx
@@ -143,7 +143,7 @@
 <file path=ppt/revisionInfo.xml><?xml version="1.0" encoding="utf-8"?>
 <p1510:revInfo xmlns:a="http://schemas.openxmlformats.org/drawingml/2006/main" xmlns:r="http://schemas.openxmlformats.org/officeDocument/2006/relationships" xmlns:p1510="http://schemas.microsoft.com/office/powerpoint/2015/10/main">
   <p1510:revLst>
-    <p1510:client id="{8BC4D987-7C24-43FF-96C8-9DB94FB96374}" v="1" dt="2024-09-08T04:09:21.579"/>
+    <p1510:client id="{8BC4D987-7C24-43FF-96C8-9DB94FB96374}" v="11" dt="2024-09-08T04:23:13.811"/>
   </p1510:revLst>
 </p1510:revInfo>
 </file>
@@ -1383,23 +1383,63 @@
   </pc:docChgLst>
   <pc:docChgLst>
     <pc:chgData name="Linlin Yan" userId="374dee16-958d-40d3-a6d4-d8fc4255ca54" providerId="ADAL" clId="{8BC4D987-7C24-43FF-96C8-9DB94FB96374}"/>
-    <pc:docChg chg="modSld">
-      <pc:chgData name="Linlin Yan" userId="374dee16-958d-40d3-a6d4-d8fc4255ca54" providerId="ADAL" clId="{8BC4D987-7C24-43FF-96C8-9DB94FB96374}" dt="2024-09-08T04:10:33.712" v="3" actId="1076"/>
+    <pc:docChg chg="undo custSel modSld">
+      <pc:chgData name="Linlin Yan" userId="374dee16-958d-40d3-a6d4-d8fc4255ca54" providerId="ADAL" clId="{8BC4D987-7C24-43FF-96C8-9DB94FB96374}" dt="2024-09-08T04:24:16.624" v="123" actId="14100"/>
       <pc:docMkLst>
         <pc:docMk/>
       </pc:docMkLst>
-      <pc:sldChg chg="addSp modSp mod">
-        <pc:chgData name="Linlin Yan" userId="374dee16-958d-40d3-a6d4-d8fc4255ca54" providerId="ADAL" clId="{8BC4D987-7C24-43FF-96C8-9DB94FB96374}" dt="2024-09-08T04:10:33.712" v="3" actId="1076"/>
+      <pc:sldChg chg="addSp delSp modSp mod">
+        <pc:chgData name="Linlin Yan" userId="374dee16-958d-40d3-a6d4-d8fc4255ca54" providerId="ADAL" clId="{8BC4D987-7C24-43FF-96C8-9DB94FB96374}" dt="2024-09-08T04:24:16.624" v="123" actId="14100"/>
         <pc:sldMkLst>
           <pc:docMk/>
           <pc:sldMk cId="4272575995" sldId="256"/>
         </pc:sldMkLst>
+        <pc:spChg chg="mod">
+          <ac:chgData name="Linlin Yan" userId="374dee16-958d-40d3-a6d4-d8fc4255ca54" providerId="ADAL" clId="{8BC4D987-7C24-43FF-96C8-9DB94FB96374}" dt="2024-09-08T04:21:34.748" v="79" actId="20577"/>
+          <ac:spMkLst>
+            <pc:docMk/>
+            <pc:sldMk cId="4272575995" sldId="256"/>
+            <ac:spMk id="3" creationId="{1F16C166-9ECE-1F6A-CB42-C76E0F346BF3}"/>
+          </ac:spMkLst>
+        </pc:spChg>
+        <pc:spChg chg="add mod">
+          <ac:chgData name="Linlin Yan" userId="374dee16-958d-40d3-a6d4-d8fc4255ca54" providerId="ADAL" clId="{8BC4D987-7C24-43FF-96C8-9DB94FB96374}" dt="2024-09-08T04:22:51.835" v="106" actId="1038"/>
+          <ac:spMkLst>
+            <pc:docMk/>
+            <pc:sldMk cId="4272575995" sldId="256"/>
+            <ac:spMk id="8" creationId="{741531D4-192D-2244-E1CF-E4DABE36B939}"/>
+          </ac:spMkLst>
+        </pc:spChg>
+        <pc:spChg chg="mod">
+          <ac:chgData name="Linlin Yan" userId="374dee16-958d-40d3-a6d4-d8fc4255ca54" providerId="ADAL" clId="{8BC4D987-7C24-43FF-96C8-9DB94FB96374}" dt="2024-09-08T04:23:18.235" v="120" actId="20577"/>
+          <ac:spMkLst>
+            <pc:docMk/>
+            <pc:sldMk cId="4272575995" sldId="256"/>
+            <ac:spMk id="18" creationId="{687164CC-A4F0-5BD9-6212-29728903452F}"/>
+          </ac:spMkLst>
+        </pc:spChg>
         <pc:picChg chg="add mod">
-          <ac:chgData name="Linlin Yan" userId="374dee16-958d-40d3-a6d4-d8fc4255ca54" providerId="ADAL" clId="{8BC4D987-7C24-43FF-96C8-9DB94FB96374}" dt="2024-09-08T04:10:33.712" v="3" actId="1076"/>
+          <ac:chgData name="Linlin Yan" userId="374dee16-958d-40d3-a6d4-d8fc4255ca54" providerId="ADAL" clId="{8BC4D987-7C24-43FF-96C8-9DB94FB96374}" dt="2024-09-08T04:24:16.624" v="123" actId="14100"/>
           <ac:picMkLst>
             <pc:docMk/>
             <pc:sldMk cId="4272575995" sldId="256"/>
             <ac:picMk id="2" creationId="{C1005C2F-C3BF-0924-CF5B-EE2283B7BAAF}"/>
+          </ac:picMkLst>
+        </pc:picChg>
+        <pc:picChg chg="add del mod">
+          <ac:chgData name="Linlin Yan" userId="374dee16-958d-40d3-a6d4-d8fc4255ca54" providerId="ADAL" clId="{8BC4D987-7C24-43FF-96C8-9DB94FB96374}" dt="2024-09-08T04:17:08.289" v="16" actId="478"/>
+          <ac:picMkLst>
+            <pc:docMk/>
+            <pc:sldMk cId="4272575995" sldId="256"/>
+            <ac:picMk id="5" creationId="{3AD64243-7610-36A4-45F3-060C69035ACA}"/>
+          </ac:picMkLst>
+        </pc:picChg>
+        <pc:picChg chg="add mod">
+          <ac:chgData name="Linlin Yan" userId="374dee16-958d-40d3-a6d4-d8fc4255ca54" providerId="ADAL" clId="{8BC4D987-7C24-43FF-96C8-9DB94FB96374}" dt="2024-09-08T04:17:51.999" v="21" actId="1076"/>
+          <ac:picMkLst>
+            <pc:docMk/>
+            <pc:sldMk cId="4272575995" sldId="256"/>
+            <ac:picMk id="7" creationId="{B5768A2F-6D4C-8F27-D5C1-CF96D428D4DF}"/>
           </ac:picMkLst>
         </pc:picChg>
       </pc:sldChg>
@@ -5943,7 +5983,9 @@
           </a:xfrm>
         </p:spPr>
         <p:txBody>
-          <a:bodyPr/>
+          <a:bodyPr>
+            <a:normAutofit fontScale="92500" lnSpcReduction="20000"/>
+          </a:bodyPr>
           <a:lstStyle/>
           <a:p>
             <a:endParaRPr lang="en-US" altLang="zh-CN" dirty="0"/>
@@ -5958,6 +6000,21 @@
                 <a:hlinkClick r:id="rId3"/>
               </a:rPr>
               <a:t>linlin.yan@bioinfo.app</a:t>
+            </a:r>
+            <a:r>
+              <a:rPr lang="zh-CN" altLang="en-US" dirty="0"/>
+              <a:t>）</a:t>
+            </a:r>
+            <a:endParaRPr lang="en-US" altLang="zh-CN" dirty="0"/>
+          </a:p>
+          <a:p>
+            <a:r>
+              <a:rPr lang="zh-CN" altLang="en-US" dirty="0"/>
+              <a:t>北京生信助力科技有限公司（</a:t>
+            </a:r>
+            <a:r>
+              <a:rPr lang="en-US" altLang="zh-CN" dirty="0"/>
+              <a:t>Bioinformatics Assistance</a:t>
             </a:r>
             <a:r>
               <a:rPr lang="zh-CN" altLang="en-US" dirty="0"/>
@@ -6022,30 +6079,7 @@
                 <a:latin typeface="微软雅黑 Light" panose="020B0502040204020203" pitchFamily="34" charset="-122"/>
                 <a:ea typeface="微软雅黑 Light" panose="020B0502040204020203" pitchFamily="34" charset="-122"/>
               </a:rPr>
-              <a:t>课程（</a:t>
-            </a:r>
-            <a:r>
-              <a:rPr lang="en-US" altLang="zh-CN" sz="2400" i="0" dirty="0">
-                <a:solidFill>
-                  <a:srgbClr val="000000"/>
-                </a:solidFill>
-                <a:effectLst/>
-                <a:latin typeface="微软雅黑 Light" panose="020B0502040204020203" pitchFamily="34" charset="-122"/>
-                <a:ea typeface="微软雅黑 Light" panose="020B0502040204020203" pitchFamily="34" charset="-122"/>
-                <a:hlinkClick r:id="rId4"/>
-              </a:rPr>
-              <a:t>https://abc.gao-lab.org/abc24/index.html</a:t>
-            </a:r>
-            <a:r>
-              <a:rPr lang="zh-CN" altLang="en-US" sz="2400" i="0" dirty="0">
-                <a:solidFill>
-                  <a:srgbClr val="000000"/>
-                </a:solidFill>
-                <a:effectLst/>
-                <a:latin typeface="微软雅黑 Light" panose="020B0502040204020203" pitchFamily="34" charset="-122"/>
-                <a:ea typeface="微软雅黑 Light" panose="020B0502040204020203" pitchFamily="34" charset="-122"/>
-              </a:rPr>
-              <a:t>）</a:t>
+              <a:t>课程</a:t>
             </a:r>
             <a:endParaRPr lang="en-US" altLang="zh-CN" sz="2400" i="0" dirty="0">
               <a:solidFill>
@@ -6073,10 +6107,10 @@
           <p:nvPr/>
         </p:nvPicPr>
         <p:blipFill>
-          <a:blip r:embed="rId5">
+          <a:blip r:embed="rId4">
             <a:extLst>
               <a:ext uri="{96DAC541-7B7A-43D3-8B79-37D633B846F1}">
-                <asvg:svgBlip xmlns:asvg="http://schemas.microsoft.com/office/drawing/2016/SVG/main" r:embed="rId6"/>
+                <asvg:svgBlip xmlns:asvg="http://schemas.microsoft.com/office/drawing/2016/SVG/main" r:embed="rId5"/>
               </a:ext>
             </a:extLst>
           </a:blip>
@@ -6086,14 +6120,80 @@
         </p:blipFill>
         <p:spPr>
           <a:xfrm>
-            <a:off x="9485697" y="4549926"/>
-            <a:ext cx="1708483" cy="1708483"/>
+            <a:off x="9731141" y="406836"/>
+            <a:ext cx="1722920" cy="1722922"/>
           </a:xfrm>
           <a:prstGeom prst="rect">
             <a:avLst/>
           </a:prstGeom>
         </p:spPr>
       </p:pic>
+      <p:pic>
+        <p:nvPicPr>
+          <p:cNvPr id="7" name="图片 6">
+            <a:extLst>
+              <a:ext uri="{FF2B5EF4-FFF2-40B4-BE49-F238E27FC236}">
+                <a16:creationId xmlns:a16="http://schemas.microsoft.com/office/drawing/2014/main" id="{B5768A2F-6D4C-8F27-D5C1-CF96D428D4DF}"/>
+              </a:ext>
+            </a:extLst>
+          </p:cNvPr>
+          <p:cNvPicPr>
+            <a:picLocks noChangeAspect="1"/>
+          </p:cNvPicPr>
+          <p:nvPr/>
+        </p:nvPicPr>
+        <p:blipFill>
+          <a:blip r:embed="rId6"/>
+          <a:stretch>
+            <a:fillRect/>
+          </a:stretch>
+        </p:blipFill>
+        <p:spPr>
+          <a:xfrm>
+            <a:off x="9991023" y="4994145"/>
+            <a:ext cx="1203157" cy="1203157"/>
+          </a:xfrm>
+          <a:prstGeom prst="rect">
+            <a:avLst/>
+          </a:prstGeom>
+        </p:spPr>
+      </p:pic>
+      <p:sp>
+        <p:nvSpPr>
+          <p:cNvPr id="8" name="文本框 7">
+            <a:extLst>
+              <a:ext uri="{FF2B5EF4-FFF2-40B4-BE49-F238E27FC236}">
+                <a16:creationId xmlns:a16="http://schemas.microsoft.com/office/drawing/2014/main" id="{741531D4-192D-2244-E1CF-E4DABE36B939}"/>
+              </a:ext>
+            </a:extLst>
+          </p:cNvPr>
+          <p:cNvSpPr txBox="1"/>
+          <p:nvPr/>
+        </p:nvSpPr>
+        <p:spPr>
+          <a:xfrm>
+            <a:off x="9881516" y="6191282"/>
+            <a:ext cx="1441420" cy="307777"/>
+          </a:xfrm>
+          <a:prstGeom prst="rect">
+            <a:avLst/>
+          </a:prstGeom>
+          <a:noFill/>
+        </p:spPr>
+        <p:txBody>
+          <a:bodyPr wrap="none" rtlCol="0">
+            <a:spAutoFit/>
+          </a:bodyPr>
+          <a:lstStyle/>
+          <a:p>
+            <a:pPr algn="ctr"/>
+            <a:r>
+              <a:rPr lang="zh-CN" altLang="en-US" sz="1400" dirty="0"/>
+              <a:t>扫描下载本课件</a:t>
+            </a:r>
+          </a:p>
+        </p:txBody>
+      </p:sp>
     </p:spTree>
     <p:extLst>
       <p:ext uri="{BB962C8B-B14F-4D97-AF65-F5344CB8AC3E}">

</xml_diff>